<commit_message>
completed journal and project report
</commit_message>
<xml_diff>
--- a/review/pptx/review-0.pptx
+++ b/review/pptx/review-0.pptx
@@ -331,7 +331,7 @@
             <a:fld id="{1D8BD707-D9CF-40AE-B4C6-C98DA3205C09}" type="datetimeFigureOut">
               <a:rPr lang="en-US" smtClean="0"/>
               <a:pPr/>
-              <a:t>3/11/2025</a:t>
+              <a:t>5/15/2025</a:t>
             </a:fld>
             <a:endParaRPr lang="en-US"/>
           </a:p>
@@ -496,7 +496,7 @@
             <a:fld id="{1D8BD707-D9CF-40AE-B4C6-C98DA3205C09}" type="datetimeFigureOut">
               <a:rPr lang="en-US" smtClean="0"/>
               <a:pPr/>
-              <a:t>3/11/2025</a:t>
+              <a:t>5/15/2025</a:t>
             </a:fld>
             <a:endParaRPr lang="en-US"/>
           </a:p>
@@ -671,7 +671,7 @@
             <a:fld id="{1D8BD707-D9CF-40AE-B4C6-C98DA3205C09}" type="datetimeFigureOut">
               <a:rPr lang="en-US" smtClean="0"/>
               <a:pPr/>
-              <a:t>3/11/2025</a:t>
+              <a:t>5/15/2025</a:t>
             </a:fld>
             <a:endParaRPr lang="en-US"/>
           </a:p>
@@ -836,7 +836,7 @@
             <a:fld id="{1D8BD707-D9CF-40AE-B4C6-C98DA3205C09}" type="datetimeFigureOut">
               <a:rPr lang="en-US" smtClean="0"/>
               <a:pPr/>
-              <a:t>3/11/2025</a:t>
+              <a:t>5/15/2025</a:t>
             </a:fld>
             <a:endParaRPr lang="en-US"/>
           </a:p>
@@ -1078,7 +1078,7 @@
             <a:fld id="{1D8BD707-D9CF-40AE-B4C6-C98DA3205C09}" type="datetimeFigureOut">
               <a:rPr lang="en-US" smtClean="0"/>
               <a:pPr/>
-              <a:t>3/11/2025</a:t>
+              <a:t>5/15/2025</a:t>
             </a:fld>
             <a:endParaRPr lang="en-US"/>
           </a:p>
@@ -1360,7 +1360,7 @@
             <a:fld id="{1D8BD707-D9CF-40AE-B4C6-C98DA3205C09}" type="datetimeFigureOut">
               <a:rPr lang="en-US" smtClean="0"/>
               <a:pPr/>
-              <a:t>3/11/2025</a:t>
+              <a:t>5/15/2025</a:t>
             </a:fld>
             <a:endParaRPr lang="en-US"/>
           </a:p>
@@ -1776,7 +1776,7 @@
             <a:fld id="{1D8BD707-D9CF-40AE-B4C6-C98DA3205C09}" type="datetimeFigureOut">
               <a:rPr lang="en-US" smtClean="0"/>
               <a:pPr/>
-              <a:t>3/11/2025</a:t>
+              <a:t>5/15/2025</a:t>
             </a:fld>
             <a:endParaRPr lang="en-US"/>
           </a:p>
@@ -1890,7 +1890,7 @@
             <a:fld id="{1D8BD707-D9CF-40AE-B4C6-C98DA3205C09}" type="datetimeFigureOut">
               <a:rPr lang="en-US" smtClean="0"/>
               <a:pPr/>
-              <a:t>3/11/2025</a:t>
+              <a:t>5/15/2025</a:t>
             </a:fld>
             <a:endParaRPr lang="en-US"/>
           </a:p>
@@ -1982,7 +1982,7 @@
             <a:fld id="{1D8BD707-D9CF-40AE-B4C6-C98DA3205C09}" type="datetimeFigureOut">
               <a:rPr lang="en-US" smtClean="0"/>
               <a:pPr/>
-              <a:t>3/11/2025</a:t>
+              <a:t>5/15/2025</a:t>
             </a:fld>
             <a:endParaRPr lang="en-US"/>
           </a:p>
@@ -2254,7 +2254,7 @@
             <a:fld id="{1D8BD707-D9CF-40AE-B4C6-C98DA3205C09}" type="datetimeFigureOut">
               <a:rPr lang="en-US" smtClean="0"/>
               <a:pPr/>
-              <a:t>3/11/2025</a:t>
+              <a:t>5/15/2025</a:t>
             </a:fld>
             <a:endParaRPr lang="en-US"/>
           </a:p>
@@ -2503,7 +2503,7 @@
             <a:fld id="{1D8BD707-D9CF-40AE-B4C6-C98DA3205C09}" type="datetimeFigureOut">
               <a:rPr lang="en-US" smtClean="0"/>
               <a:pPr/>
-              <a:t>3/11/2025</a:t>
+              <a:t>5/15/2025</a:t>
             </a:fld>
             <a:endParaRPr lang="en-US"/>
           </a:p>
@@ -2711,7 +2711,7 @@
             <a:fld id="{1D8BD707-D9CF-40AE-B4C6-C98DA3205C09}" type="datetimeFigureOut">
               <a:rPr lang="en-US" smtClean="0"/>
               <a:pPr/>
-              <a:t>3/11/2025</a:t>
+              <a:t>5/15/2025</a:t>
             </a:fld>
             <a:endParaRPr lang="en-US"/>
           </a:p>
@@ -4622,7 +4622,13 @@
           <p:cNvGraphicFramePr>
             <a:graphicFrameLocks noGrp="1"/>
           </p:cNvGraphicFramePr>
-          <p:nvPr/>
+          <p:nvPr>
+            <p:extLst>
+              <p:ext uri="{D42A27DB-BD31-4B8C-83A1-F6EECF244321}">
+                <p14:modId xmlns:p14="http://schemas.microsoft.com/office/powerpoint/2010/main" val="819510943"/>
+              </p:ext>
+            </p:extLst>
+          </p:nvPr>
         </p:nvGraphicFramePr>
         <p:xfrm>
           <a:off x="1028700" y="2495550"/>
@@ -5301,7 +5307,7 @@
                         <a:defRPr/>
                       </a:pPr>
                       <a:r>
-                        <a:rPr lang="en-US" sz="1599" u="sng">
+                        <a:rPr lang="en-US" sz="1599" u="sng" dirty="0">
                           <a:solidFill>
                             <a:srgbClr val="000000"/>
                           </a:solidFill>
@@ -5313,7 +5319,7 @@
                         </a:rPr>
                         <a:t>https://ieeexplore.ieee.org/document/7497258</a:t>
                       </a:r>
-                      <a:endParaRPr lang="en-US" sz="1100"/>
+                      <a:endParaRPr lang="en-US" sz="1100" dirty="0"/>
                     </a:p>
                   </a:txBody>
                   <a:tcPr marL="95250" marR="95250" marT="95250" marB="95250" anchor="ctr">
@@ -5642,14 +5648,25 @@
                     <a:bodyPr/>
                     <a:lstStyle/>
                     <a:p>
-                      <a:pPr algn="l">
+                      <a:pPr marL="0" marR="0" lvl="0" indent="0" algn="l" defTabSz="914400" rtl="0" eaLnBrk="1" fontAlgn="auto" latinLnBrk="0" hangingPunct="1">
                         <a:lnSpc>
                           <a:spcPts val="2239"/>
                         </a:lnSpc>
+                        <a:spcBef>
+                          <a:spcPts val="0"/>
+                        </a:spcBef>
+                        <a:spcAft>
+                          <a:spcPts val="0"/>
+                        </a:spcAft>
+                        <a:buClrTx/>
+                        <a:buSzTx/>
+                        <a:buFontTx/>
+                        <a:buNone/>
+                        <a:tabLst/>
                         <a:defRPr/>
                       </a:pPr>
                       <a:r>
-                        <a:rPr lang="en-US" sz="1599" u="sng">
+                        <a:rPr lang="en-US" sz="1599" u="sng" dirty="0">
                           <a:solidFill>
                             <a:srgbClr val="000000"/>
                           </a:solidFill>
@@ -5657,11 +5674,11 @@
                           <a:ea typeface="Now"/>
                           <a:cs typeface="Now"/>
                           <a:sym typeface="Now"/>
-                          <a:hlinkClick r:id="rId6" tooltip="https://ieeexplore.ieee.org/document/10117106"/>
+                          <a:hlinkClick r:id="rId6" tooltip="https://ieeexplore.ieee.org/document/9036818"/>
                         </a:rPr>
-                        <a:t>https://ieeexplore.ieee.org/document/10117106</a:t>
+                        <a:t>https://ieeexplore.ieee.org/document/9359107</a:t>
                       </a:r>
-                      <a:endParaRPr lang="en-US" sz="1100"/>
+                      <a:endParaRPr lang="en-US" sz="1100" dirty="0"/>
                     </a:p>
                   </a:txBody>
                   <a:tcPr marL="95250" marR="95250" marT="95250" marB="95250" anchor="ctr">
@@ -5990,14 +6007,25 @@
                     <a:bodyPr/>
                     <a:lstStyle/>
                     <a:p>
-                      <a:pPr algn="l">
+                      <a:pPr marL="0" marR="0" lvl="0" indent="0" algn="l" defTabSz="914400" rtl="0" eaLnBrk="1" fontAlgn="auto" latinLnBrk="0" hangingPunct="1">
                         <a:lnSpc>
                           <a:spcPts val="2239"/>
                         </a:lnSpc>
+                        <a:spcBef>
+                          <a:spcPts val="0"/>
+                        </a:spcBef>
+                        <a:spcAft>
+                          <a:spcPts val="0"/>
+                        </a:spcAft>
+                        <a:buClrTx/>
+                        <a:buSzTx/>
+                        <a:buFontTx/>
+                        <a:buNone/>
+                        <a:tabLst/>
                         <a:defRPr/>
                       </a:pPr>
                       <a:r>
-                        <a:rPr lang="en-US" sz="1599" u="sng">
+                        <a:rPr lang="en-US" sz="1599" u="sng" dirty="0">
                           <a:solidFill>
                             <a:srgbClr val="000000"/>
                           </a:solidFill>
@@ -6005,11 +6033,11 @@
                           <a:ea typeface="Now"/>
                           <a:cs typeface="Now"/>
                           <a:sym typeface="Now"/>
-                          <a:hlinkClick r:id="rId7" tooltip="https://ieeexplore.ieee.org/document/10325722"/>
+                          <a:hlinkClick r:id="rId7" tooltip="https://ieeexplore.ieee.org/document/10117106"/>
                         </a:rPr>
-                        <a:t>https://ieeexplore.ieee.org/document/10325722</a:t>
+                        <a:t>https://ieeexplore.ieee.org/document/10426375</a:t>
                       </a:r>
-                      <a:endParaRPr lang="en-US" sz="1100"/>
+                      <a:endParaRPr lang="en-US" sz="1100" dirty="0"/>
                     </a:p>
                   </a:txBody>
                   <a:tcPr marL="95250" marR="95250" marT="95250" marB="95250" anchor="ctr">
@@ -6346,10 +6374,21 @@
                     <a:bodyPr/>
                     <a:lstStyle/>
                     <a:p>
-                      <a:pPr algn="l">
+                      <a:pPr marL="0" marR="0" lvl="0" indent="0" algn="l" defTabSz="914400" rtl="0" eaLnBrk="1" fontAlgn="auto" latinLnBrk="0" hangingPunct="1">
                         <a:lnSpc>
                           <a:spcPts val="2239"/>
                         </a:lnSpc>
+                        <a:spcBef>
+                          <a:spcPts val="0"/>
+                        </a:spcBef>
+                        <a:spcAft>
+                          <a:spcPts val="0"/>
+                        </a:spcAft>
+                        <a:buClrTx/>
+                        <a:buSzTx/>
+                        <a:buFontTx/>
+                        <a:buNone/>
+                        <a:tabLst/>
                         <a:defRPr/>
                       </a:pPr>
                       <a:r>
@@ -6361,9 +6400,9 @@
                           <a:ea typeface="Now"/>
                           <a:cs typeface="Now"/>
                           <a:sym typeface="Now"/>
-                          <a:hlinkClick r:id="rId8" tooltip="https://ieeexplore.ieee.org/document/9036818"/>
+                          <a:hlinkClick r:id="rId8" tooltip="https://ieeexplore.ieee.org/document/10325722"/>
                         </a:rPr>
-                        <a:t>https://ieeexplore.ieee.org/document/9036818</a:t>
+                        <a:t>https://ieeexplore.ieee.org/document/10210084</a:t>
                       </a:r>
                       <a:endParaRPr lang="en-US" sz="1100" dirty="0"/>
                     </a:p>

</xml_diff>